<commit_message>
minor edits and a few more slides to outline the notebook topics
</commit_message>
<xml_diff>
--- a/Presentations/PPAS_BasicDataManipulation-Python.pptx
+++ b/Presentations/PPAS_BasicDataManipulation-Python.pptx
@@ -5,7 +5,7 @@
     <p:sldMasterId id="2147483660" r:id="rId1"/>
   </p:sldMasterIdLst>
   <p:notesMasterIdLst>
-    <p:notesMasterId r:id="rId21"/>
+    <p:notesMasterId r:id="rId24"/>
   </p:notesMasterIdLst>
   <p:sldIdLst>
     <p:sldId id="256" r:id="rId2"/>
@@ -26,7 +26,10 @@
     <p:sldId id="271" r:id="rId17"/>
     <p:sldId id="272" r:id="rId18"/>
     <p:sldId id="273" r:id="rId19"/>
-    <p:sldId id="274" r:id="rId20"/>
+    <p:sldId id="275" r:id="rId20"/>
+    <p:sldId id="276" r:id="rId21"/>
+    <p:sldId id="277" r:id="rId22"/>
+    <p:sldId id="274" r:id="rId23"/>
   </p:sldIdLst>
   <p:sldSz cx="12192000" cy="6858000"/>
   <p:notesSz cx="6858000" cy="9144000"/>
@@ -136,13 +139,231 @@
 <file path=ppt/revisionInfo.xml><?xml version="1.0" encoding="utf-8"?>
 <p1510:revInfo xmlns:a="http://schemas.openxmlformats.org/drawingml/2006/main" xmlns:r="http://schemas.openxmlformats.org/officeDocument/2006/relationships" xmlns:p1510="http://schemas.microsoft.com/office/powerpoint/2015/10/main">
   <p1510:revLst>
-    <p1510:client id="{A7230131-F9EB-4886-BD36-36014703E866}" v="74" dt="2021-09-25T22:14:51.506"/>
+    <p1510:client id="{CA896737-5F2B-42E6-A67F-4BB19AE828B0}" v="15" dt="2021-09-28T17:27:03.917"/>
   </p1510:revLst>
 </p1510:revInfo>
 </file>
 
 <file path=ppt/changesInfos/changesInfo1.xml><?xml version="1.0" encoding="utf-8"?>
 <pc:chgInfo xmlns:a="http://schemas.openxmlformats.org/drawingml/2006/main" xmlns:r="http://schemas.openxmlformats.org/officeDocument/2006/relationships" xmlns:ac="http://schemas.microsoft.com/office/drawing/2013/main/command" xmlns:pc="http://schemas.microsoft.com/office/powerpoint/2013/main/command">
+  <pc:docChgLst>
+    <pc:chgData name="HANEWINCKEL Nick" userId="1d5e5d89-e3b1-4c99-9a4e-338ac1f48fd2" providerId="ADAL" clId="{CA896737-5F2B-42E6-A67F-4BB19AE828B0}"/>
+    <pc:docChg chg="undo custSel addSld modSld">
+      <pc:chgData name="HANEWINCKEL Nick" userId="1d5e5d89-e3b1-4c99-9a4e-338ac1f48fd2" providerId="ADAL" clId="{CA896737-5F2B-42E6-A67F-4BB19AE828B0}" dt="2021-09-28T17:27:17.778" v="1009" actId="20577"/>
+      <pc:docMkLst>
+        <pc:docMk/>
+      </pc:docMkLst>
+      <pc:sldChg chg="modSp mod">
+        <pc:chgData name="HANEWINCKEL Nick" userId="1d5e5d89-e3b1-4c99-9a4e-338ac1f48fd2" providerId="ADAL" clId="{CA896737-5F2B-42E6-A67F-4BB19AE828B0}" dt="2021-09-27T22:34:32.156" v="1" actId="20577"/>
+        <pc:sldMkLst>
+          <pc:docMk/>
+          <pc:sldMk cId="2632818794" sldId="258"/>
+        </pc:sldMkLst>
+        <pc:spChg chg="mod">
+          <ac:chgData name="HANEWINCKEL Nick" userId="1d5e5d89-e3b1-4c99-9a4e-338ac1f48fd2" providerId="ADAL" clId="{CA896737-5F2B-42E6-A67F-4BB19AE828B0}" dt="2021-09-27T22:34:32.156" v="1" actId="20577"/>
+          <ac:spMkLst>
+            <pc:docMk/>
+            <pc:sldMk cId="2632818794" sldId="258"/>
+            <ac:spMk id="15" creationId="{B1031237-7E4A-4D9E-AA0A-0D08AFF7F37A}"/>
+          </ac:spMkLst>
+        </pc:spChg>
+      </pc:sldChg>
+      <pc:sldChg chg="modSp mod">
+        <pc:chgData name="HANEWINCKEL Nick" userId="1d5e5d89-e3b1-4c99-9a4e-338ac1f48fd2" providerId="ADAL" clId="{CA896737-5F2B-42E6-A67F-4BB19AE828B0}" dt="2021-09-27T22:34:24.949" v="0" actId="20577"/>
+        <pc:sldMkLst>
+          <pc:docMk/>
+          <pc:sldMk cId="1430693284" sldId="261"/>
+        </pc:sldMkLst>
+        <pc:spChg chg="mod">
+          <ac:chgData name="HANEWINCKEL Nick" userId="1d5e5d89-e3b1-4c99-9a4e-338ac1f48fd2" providerId="ADAL" clId="{CA896737-5F2B-42E6-A67F-4BB19AE828B0}" dt="2021-09-27T22:34:24.949" v="0" actId="20577"/>
+          <ac:spMkLst>
+            <pc:docMk/>
+            <pc:sldMk cId="1430693284" sldId="261"/>
+            <ac:spMk id="10" creationId="{04AE8948-DF9B-4080-BD3E-B9609E9417D9}"/>
+          </ac:spMkLst>
+        </pc:spChg>
+      </pc:sldChg>
+      <pc:sldChg chg="modSp mod">
+        <pc:chgData name="HANEWINCKEL Nick" userId="1d5e5d89-e3b1-4c99-9a4e-338ac1f48fd2" providerId="ADAL" clId="{CA896737-5F2B-42E6-A67F-4BB19AE828B0}" dt="2021-09-27T22:37:39.298" v="3" actId="20577"/>
+        <pc:sldMkLst>
+          <pc:docMk/>
+          <pc:sldMk cId="1645113745" sldId="264"/>
+        </pc:sldMkLst>
+        <pc:graphicFrameChg chg="modGraphic">
+          <ac:chgData name="HANEWINCKEL Nick" userId="1d5e5d89-e3b1-4c99-9a4e-338ac1f48fd2" providerId="ADAL" clId="{CA896737-5F2B-42E6-A67F-4BB19AE828B0}" dt="2021-09-27T22:37:39.298" v="3" actId="20577"/>
+          <ac:graphicFrameMkLst>
+            <pc:docMk/>
+            <pc:sldMk cId="1645113745" sldId="264"/>
+            <ac:graphicFrameMk id="5" creationId="{A987B4C4-324C-4A66-BEC2-9926D63EE88D}"/>
+          </ac:graphicFrameMkLst>
+        </pc:graphicFrameChg>
+      </pc:sldChg>
+      <pc:sldChg chg="addSp delSp modSp mod">
+        <pc:chgData name="HANEWINCKEL Nick" userId="1d5e5d89-e3b1-4c99-9a4e-338ac1f48fd2" providerId="ADAL" clId="{CA896737-5F2B-42E6-A67F-4BB19AE828B0}" dt="2021-09-28T17:12:19.383" v="19" actId="12789"/>
+        <pc:sldMkLst>
+          <pc:docMk/>
+          <pc:sldMk cId="378296408" sldId="274"/>
+        </pc:sldMkLst>
+        <pc:spChg chg="del">
+          <ac:chgData name="HANEWINCKEL Nick" userId="1d5e5d89-e3b1-4c99-9a4e-338ac1f48fd2" providerId="ADAL" clId="{CA896737-5F2B-42E6-A67F-4BB19AE828B0}" dt="2021-09-28T17:12:04.016" v="17" actId="478"/>
+          <ac:spMkLst>
+            <pc:docMk/>
+            <pc:sldMk cId="378296408" sldId="274"/>
+            <ac:spMk id="2" creationId="{2B7FCA5D-254C-4DCE-ADC0-8431A6D7E488}"/>
+          </ac:spMkLst>
+        </pc:spChg>
+        <pc:spChg chg="mod">
+          <ac:chgData name="HANEWINCKEL Nick" userId="1d5e5d89-e3b1-4c99-9a4e-338ac1f48fd2" providerId="ADAL" clId="{CA896737-5F2B-42E6-A67F-4BB19AE828B0}" dt="2021-09-28T17:07:24.380" v="13" actId="20577"/>
+          <ac:spMkLst>
+            <pc:docMk/>
+            <pc:sldMk cId="378296408" sldId="274"/>
+            <ac:spMk id="4" creationId="{CC106F12-BA2E-4C7E-A35B-F5E06CDBEE57}"/>
+          </ac:spMkLst>
+        </pc:spChg>
+        <pc:picChg chg="add mod">
+          <ac:chgData name="HANEWINCKEL Nick" userId="1d5e5d89-e3b1-4c99-9a4e-338ac1f48fd2" providerId="ADAL" clId="{CA896737-5F2B-42E6-A67F-4BB19AE828B0}" dt="2021-09-28T17:12:19.383" v="19" actId="12789"/>
+          <ac:picMkLst>
+            <pc:docMk/>
+            <pc:sldMk cId="378296408" sldId="274"/>
+            <ac:picMk id="1026" creationId="{62A40B6A-1A53-48C0-885A-0B84603292F2}"/>
+          </ac:picMkLst>
+        </pc:picChg>
+      </pc:sldChg>
+      <pc:sldChg chg="addSp delSp modSp new mod">
+        <pc:chgData name="HANEWINCKEL Nick" userId="1d5e5d89-e3b1-4c99-9a4e-338ac1f48fd2" providerId="ADAL" clId="{CA896737-5F2B-42E6-A67F-4BB19AE828B0}" dt="2021-09-28T17:24:38.111" v="824" actId="20577"/>
+        <pc:sldMkLst>
+          <pc:docMk/>
+          <pc:sldMk cId="1168521859" sldId="275"/>
+        </pc:sldMkLst>
+        <pc:spChg chg="add del">
+          <ac:chgData name="HANEWINCKEL Nick" userId="1d5e5d89-e3b1-4c99-9a4e-338ac1f48fd2" providerId="ADAL" clId="{CA896737-5F2B-42E6-A67F-4BB19AE828B0}" dt="2021-09-28T17:17:14.987" v="213" actId="478"/>
+          <ac:spMkLst>
+            <pc:docMk/>
+            <pc:sldMk cId="1168521859" sldId="275"/>
+            <ac:spMk id="2" creationId="{C9856389-8A94-4F64-9A3A-12B789F3AEC3}"/>
+          </ac:spMkLst>
+        </pc:spChg>
+        <pc:spChg chg="mod">
+          <ac:chgData name="HANEWINCKEL Nick" userId="1d5e5d89-e3b1-4c99-9a4e-338ac1f48fd2" providerId="ADAL" clId="{CA896737-5F2B-42E6-A67F-4BB19AE828B0}" dt="2021-09-28T17:14:43.522" v="43" actId="20577"/>
+          <ac:spMkLst>
+            <pc:docMk/>
+            <pc:sldMk cId="1168521859" sldId="275"/>
+            <ac:spMk id="4" creationId="{0F900ACC-CAD6-4F87-A851-9B22FD2D9DB1}"/>
+          </ac:spMkLst>
+        </pc:spChg>
+        <pc:spChg chg="add mod">
+          <ac:chgData name="HANEWINCKEL Nick" userId="1d5e5d89-e3b1-4c99-9a4e-338ac1f48fd2" providerId="ADAL" clId="{CA896737-5F2B-42E6-A67F-4BB19AE828B0}" dt="2021-09-28T17:18:22.785" v="222" actId="164"/>
+          <ac:spMkLst>
+            <pc:docMk/>
+            <pc:sldMk cId="1168521859" sldId="275"/>
+            <ac:spMk id="5" creationId="{667D86CE-8801-4A79-9A4C-D8E96512B54A}"/>
+          </ac:spMkLst>
+        </pc:spChg>
+        <pc:spChg chg="add del mod">
+          <ac:chgData name="HANEWINCKEL Nick" userId="1d5e5d89-e3b1-4c99-9a4e-338ac1f48fd2" providerId="ADAL" clId="{CA896737-5F2B-42E6-A67F-4BB19AE828B0}" dt="2021-09-28T17:16:46.334" v="206"/>
+          <ac:spMkLst>
+            <pc:docMk/>
+            <pc:sldMk cId="1168521859" sldId="275"/>
+            <ac:spMk id="6" creationId="{AFA77543-6DA7-4FA6-8B2C-289A5A7414FA}"/>
+          </ac:spMkLst>
+        </pc:spChg>
+        <pc:spChg chg="add del mod">
+          <ac:chgData name="HANEWINCKEL Nick" userId="1d5e5d89-e3b1-4c99-9a4e-338ac1f48fd2" providerId="ADAL" clId="{CA896737-5F2B-42E6-A67F-4BB19AE828B0}" dt="2021-09-28T17:16:54.411" v="210" actId="478"/>
+          <ac:spMkLst>
+            <pc:docMk/>
+            <pc:sldMk cId="1168521859" sldId="275"/>
+            <ac:spMk id="7" creationId="{639C9EE8-CF95-42DE-A27F-0615B2D4BAB1}"/>
+          </ac:spMkLst>
+        </pc:spChg>
+        <pc:spChg chg="add del mod">
+          <ac:chgData name="HANEWINCKEL Nick" userId="1d5e5d89-e3b1-4c99-9a4e-338ac1f48fd2" providerId="ADAL" clId="{CA896737-5F2B-42E6-A67F-4BB19AE828B0}" dt="2021-09-28T17:16:59.772" v="212"/>
+          <ac:spMkLst>
+            <pc:docMk/>
+            <pc:sldMk cId="1168521859" sldId="275"/>
+            <ac:spMk id="8" creationId="{7776D877-A3A4-401F-B52F-7FAC8EF93F65}"/>
+          </ac:spMkLst>
+        </pc:spChg>
+        <pc:spChg chg="add mod">
+          <ac:chgData name="HANEWINCKEL Nick" userId="1d5e5d89-e3b1-4c99-9a4e-338ac1f48fd2" providerId="ADAL" clId="{CA896737-5F2B-42E6-A67F-4BB19AE828B0}" dt="2021-09-28T17:19:23.173" v="340" actId="20577"/>
+          <ac:spMkLst>
+            <pc:docMk/>
+            <pc:sldMk cId="1168521859" sldId="275"/>
+            <ac:spMk id="9" creationId="{FE20F7C1-AA73-47C0-80EC-A8AA2DC66068}"/>
+          </ac:spMkLst>
+        </pc:spChg>
+        <pc:spChg chg="add mod">
+          <ac:chgData name="HANEWINCKEL Nick" userId="1d5e5d89-e3b1-4c99-9a4e-338ac1f48fd2" providerId="ADAL" clId="{CA896737-5F2B-42E6-A67F-4BB19AE828B0}" dt="2021-09-28T17:21:39.868" v="566" actId="20577"/>
+          <ac:spMkLst>
+            <pc:docMk/>
+            <pc:sldMk cId="1168521859" sldId="275"/>
+            <ac:spMk id="11" creationId="{44463066-BEE9-49D4-8203-765344EDD2A4}"/>
+          </ac:spMkLst>
+        </pc:spChg>
+        <pc:spChg chg="add mod">
+          <ac:chgData name="HANEWINCKEL Nick" userId="1d5e5d89-e3b1-4c99-9a4e-338ac1f48fd2" providerId="ADAL" clId="{CA896737-5F2B-42E6-A67F-4BB19AE828B0}" dt="2021-09-28T17:24:38.111" v="824" actId="20577"/>
+          <ac:spMkLst>
+            <pc:docMk/>
+            <pc:sldMk cId="1168521859" sldId="275"/>
+            <ac:spMk id="12" creationId="{A0B32E22-CE59-4FAD-80A2-030FEB0868B5}"/>
+          </ac:spMkLst>
+        </pc:spChg>
+        <pc:grpChg chg="add mod">
+          <ac:chgData name="HANEWINCKEL Nick" userId="1d5e5d89-e3b1-4c99-9a4e-338ac1f48fd2" providerId="ADAL" clId="{CA896737-5F2B-42E6-A67F-4BB19AE828B0}" dt="2021-09-28T17:18:32.185" v="225" actId="12788"/>
+          <ac:grpSpMkLst>
+            <pc:docMk/>
+            <pc:sldMk cId="1168521859" sldId="275"/>
+            <ac:grpSpMk id="10" creationId="{71F084EE-C490-4692-908E-B7E341E999CE}"/>
+          </ac:grpSpMkLst>
+        </pc:grpChg>
+      </pc:sldChg>
+      <pc:sldChg chg="modSp new mod">
+        <pc:chgData name="HANEWINCKEL Nick" userId="1d5e5d89-e3b1-4c99-9a4e-338ac1f48fd2" providerId="ADAL" clId="{CA896737-5F2B-42E6-A67F-4BB19AE828B0}" dt="2021-09-28T17:26:00.259" v="905" actId="20577"/>
+        <pc:sldMkLst>
+          <pc:docMk/>
+          <pc:sldMk cId="3806947584" sldId="276"/>
+        </pc:sldMkLst>
+        <pc:spChg chg="mod">
+          <ac:chgData name="HANEWINCKEL Nick" userId="1d5e5d89-e3b1-4c99-9a4e-338ac1f48fd2" providerId="ADAL" clId="{CA896737-5F2B-42E6-A67F-4BB19AE828B0}" dt="2021-09-28T17:26:00.259" v="905" actId="20577"/>
+          <ac:spMkLst>
+            <pc:docMk/>
+            <pc:sldMk cId="3806947584" sldId="276"/>
+            <ac:spMk id="2" creationId="{C34EB546-15B1-4E2B-AA70-41D43110B8B9}"/>
+          </ac:spMkLst>
+        </pc:spChg>
+        <pc:spChg chg="mod">
+          <ac:chgData name="HANEWINCKEL Nick" userId="1d5e5d89-e3b1-4c99-9a4e-338ac1f48fd2" providerId="ADAL" clId="{CA896737-5F2B-42E6-A67F-4BB19AE828B0}" dt="2021-09-28T17:25:46.181" v="861" actId="20577"/>
+          <ac:spMkLst>
+            <pc:docMk/>
+            <pc:sldMk cId="3806947584" sldId="276"/>
+            <ac:spMk id="4" creationId="{04E01A0A-1C33-4557-9416-6763538A819A}"/>
+          </ac:spMkLst>
+        </pc:spChg>
+      </pc:sldChg>
+      <pc:sldChg chg="modSp add mod">
+        <pc:chgData name="HANEWINCKEL Nick" userId="1d5e5d89-e3b1-4c99-9a4e-338ac1f48fd2" providerId="ADAL" clId="{CA896737-5F2B-42E6-A67F-4BB19AE828B0}" dt="2021-09-28T17:27:17.778" v="1009" actId="20577"/>
+        <pc:sldMkLst>
+          <pc:docMk/>
+          <pc:sldMk cId="3002651699" sldId="277"/>
+        </pc:sldMkLst>
+        <pc:spChg chg="mod">
+          <ac:chgData name="HANEWINCKEL Nick" userId="1d5e5d89-e3b1-4c99-9a4e-338ac1f48fd2" providerId="ADAL" clId="{CA896737-5F2B-42E6-A67F-4BB19AE828B0}" dt="2021-09-28T17:27:17.778" v="1009" actId="20577"/>
+          <ac:spMkLst>
+            <pc:docMk/>
+            <pc:sldMk cId="3002651699" sldId="277"/>
+            <ac:spMk id="2" creationId="{C34EB546-15B1-4E2B-AA70-41D43110B8B9}"/>
+          </ac:spMkLst>
+        </pc:spChg>
+        <pc:spChg chg="mod">
+          <ac:chgData name="HANEWINCKEL Nick" userId="1d5e5d89-e3b1-4c99-9a4e-338ac1f48fd2" providerId="ADAL" clId="{CA896737-5F2B-42E6-A67F-4BB19AE828B0}" dt="2021-09-28T17:26:35.359" v="914" actId="20577"/>
+          <ac:spMkLst>
+            <pc:docMk/>
+            <pc:sldMk cId="3002651699" sldId="277"/>
+            <ac:spMk id="4" creationId="{04E01A0A-1C33-4557-9416-6763538A819A}"/>
+          </ac:spMkLst>
+        </pc:spChg>
+      </pc:sldChg>
+    </pc:docChg>
+  </pc:docChgLst>
   <pc:docChgLst>
     <pc:chgData name="HANEWINCKEL Nick" userId="0d1efa69-1167-4890-9df0-7d2636f7d138" providerId="ADAL" clId="{A7230131-F9EB-4886-BD36-36014703E866}"/>
     <pc:docChg chg="undo custSel addSld modSld">
@@ -4780,7 +5001,7 @@
           <a:p>
             <a:fld id="{4C537162-B685-470B-9A89-A1F57613FC26}" type="datetimeFigureOut">
               <a:rPr lang="en-US" smtClean="0"/>
-              <a:t>9/25/2021</a:t>
+              <a:t>9/27/2021</a:t>
             </a:fld>
             <a:endParaRPr lang="en-US"/>
           </a:p>
@@ -5996,7 +6217,7 @@
           <a:p>
             <a:fld id="{C30687EE-9995-4EBB-885B-63EAD4400F12}" type="slidenum">
               <a:rPr lang="en-US" smtClean="0"/>
-              <a:t>19</a:t>
+              <a:t>22</a:t>
             </a:fld>
             <a:endParaRPr lang="en-US"/>
           </a:p>
@@ -9449,7 +9670,7 @@
           <a:p>
             <a:fld id="{2FD592B5-1404-447E-B44F-C074B400AC1C}" type="datetimeFigureOut">
               <a:rPr lang="en-US" smtClean="0"/>
-              <a:t>9/25/2021</a:t>
+              <a:t>9/27/2021</a:t>
             </a:fld>
             <a:endParaRPr lang="en-US"/>
           </a:p>
@@ -18283,35 +18504,10 @@
       </p:grpSpPr>
       <p:sp>
         <p:nvSpPr>
-          <p:cNvPr id="2" name="Content Placeholder 1">
-            <a:extLst>
-              <a:ext uri="{FF2B5EF4-FFF2-40B4-BE49-F238E27FC236}">
-                <a16:creationId xmlns:a16="http://schemas.microsoft.com/office/drawing/2014/main" id="{2B7FCA5D-254C-4DCE-ADC0-8431A6D7E488}"/>
-              </a:ext>
-            </a:extLst>
-          </p:cNvPr>
-          <p:cNvSpPr>
-            <a:spLocks noGrp="1"/>
-          </p:cNvSpPr>
-          <p:nvPr>
-            <p:ph idx="1"/>
-          </p:nvPr>
-        </p:nvSpPr>
-        <p:spPr/>
-        <p:txBody>
-          <a:bodyPr/>
-          <a:lstStyle/>
-          <a:p>
-            <a:endParaRPr lang="en-US" dirty="0"/>
-          </a:p>
-        </p:txBody>
-      </p:sp>
-      <p:sp>
-        <p:nvSpPr>
           <p:cNvPr id="3" name="Text Placeholder 2">
             <a:extLst>
               <a:ext uri="{FF2B5EF4-FFF2-40B4-BE49-F238E27FC236}">
-                <a16:creationId xmlns:a16="http://schemas.microsoft.com/office/drawing/2014/main" id="{6B23F3AF-1809-4371-8A2E-4471BD721F9F}"/>
+                <a16:creationId xmlns:a16="http://schemas.microsoft.com/office/drawing/2014/main" id="{443D7EA9-B835-4E9A-88B1-3107B104B58C}"/>
               </a:ext>
             </a:extLst>
           </p:cNvPr>
@@ -18336,7 +18532,7 @@
           <p:cNvPr id="4" name="Title 3">
             <a:extLst>
               <a:ext uri="{FF2B5EF4-FFF2-40B4-BE49-F238E27FC236}">
-                <a16:creationId xmlns:a16="http://schemas.microsoft.com/office/drawing/2014/main" id="{CC106F12-BA2E-4C7E-A35B-F5E06CDBEE57}"/>
+                <a16:creationId xmlns:a16="http://schemas.microsoft.com/office/drawing/2014/main" id="{0F900ACC-CAD6-4F87-A851-9B22FD2D9DB1}"/>
               </a:ext>
             </a:extLst>
           </p:cNvPr>
@@ -18354,7 +18550,523 @@
           <a:p>
             <a:r>
               <a:rPr lang="en-US" dirty="0"/>
-              <a:t>Pythonic Race</a:t>
+              <a:t>By Value / By Reference</a:t>
+            </a:r>
+          </a:p>
+        </p:txBody>
+      </p:sp>
+      <p:grpSp>
+        <p:nvGrpSpPr>
+          <p:cNvPr id="10" name="Group 9">
+            <a:extLst>
+              <a:ext uri="{FF2B5EF4-FFF2-40B4-BE49-F238E27FC236}">
+                <a16:creationId xmlns:a16="http://schemas.microsoft.com/office/drawing/2014/main" id="{71F084EE-C490-4692-908E-B7E341E999CE}"/>
+              </a:ext>
+            </a:extLst>
+          </p:cNvPr>
+          <p:cNvGrpSpPr/>
+          <p:nvPr/>
+        </p:nvGrpSpPr>
+        <p:grpSpPr>
+          <a:xfrm>
+            <a:off x="1457849" y="1813608"/>
+            <a:ext cx="9276303" cy="914400"/>
+            <a:chOff x="1337190" y="1813608"/>
+            <a:chExt cx="9276303" cy="914400"/>
+          </a:xfrm>
+        </p:grpSpPr>
+        <p:sp>
+          <p:nvSpPr>
+            <p:cNvPr id="5" name="Rectangle 4">
+              <a:extLst>
+                <a:ext uri="{FF2B5EF4-FFF2-40B4-BE49-F238E27FC236}">
+                  <a16:creationId xmlns:a16="http://schemas.microsoft.com/office/drawing/2014/main" id="{667D86CE-8801-4A79-9A4C-D8E96512B54A}"/>
+                </a:ext>
+              </a:extLst>
+            </p:cNvPr>
+            <p:cNvSpPr/>
+            <p:nvPr/>
+          </p:nvSpPr>
+          <p:spPr>
+            <a:xfrm>
+              <a:off x="1337190" y="1813608"/>
+              <a:ext cx="3949002" cy="914400"/>
+            </a:xfrm>
+            <a:prstGeom prst="rect">
+              <a:avLst/>
+            </a:prstGeom>
+            <a:solidFill>
+              <a:schemeClr val="tx2"/>
+            </a:solidFill>
+            <a:ln>
+              <a:noFill/>
+            </a:ln>
+          </p:spPr>
+          <p:style>
+            <a:lnRef idx="2">
+              <a:schemeClr val="accent1">
+                <a:shade val="50000"/>
+              </a:schemeClr>
+            </a:lnRef>
+            <a:fillRef idx="1">
+              <a:schemeClr val="accent1"/>
+            </a:fillRef>
+            <a:effectRef idx="0">
+              <a:schemeClr val="accent1"/>
+            </a:effectRef>
+            <a:fontRef idx="minor">
+              <a:schemeClr val="lt1"/>
+            </a:fontRef>
+          </p:style>
+          <p:txBody>
+            <a:bodyPr rot="0" spcFirstLastPara="0" vertOverflow="overflow" horzOverflow="overflow" vert="horz" wrap="square" lIns="91440" tIns="45720" rIns="91440" bIns="45720" numCol="1" spcCol="0" rtlCol="0" fromWordArt="0" anchor="ctr" anchorCtr="0" forceAA="0" compatLnSpc="1">
+              <a:prstTxWarp prst="textNoShape">
+                <a:avLst/>
+              </a:prstTxWarp>
+              <a:noAutofit/>
+            </a:bodyPr>
+            <a:lstStyle/>
+            <a:p>
+              <a:pPr algn="ctr"/>
+              <a:r>
+                <a:rPr lang="en-US" b="1" dirty="0"/>
+                <a:t>By Value</a:t>
+              </a:r>
+            </a:p>
+            <a:p>
+              <a:pPr marL="171450" indent="-171450" algn="ctr">
+                <a:buFontTx/>
+                <a:buChar char="-"/>
+              </a:pPr>
+              <a:r>
+                <a:rPr lang="en-US" sz="1400" b="1" dirty="0"/>
+                <a:t>Refers to the value a variable stores in memory</a:t>
+              </a:r>
+            </a:p>
+            <a:p>
+              <a:pPr marL="171450" indent="-171450" algn="ctr">
+                <a:buFontTx/>
+                <a:buChar char="-"/>
+              </a:pPr>
+              <a:r>
+                <a:rPr lang="en-US" sz="1400" b="1" dirty="0"/>
+                <a:t>The original object remains unchanged</a:t>
+              </a:r>
+            </a:p>
+          </p:txBody>
+        </p:sp>
+        <p:sp>
+          <p:nvSpPr>
+            <p:cNvPr id="9" name="Rectangle 8">
+              <a:extLst>
+                <a:ext uri="{FF2B5EF4-FFF2-40B4-BE49-F238E27FC236}">
+                  <a16:creationId xmlns:a16="http://schemas.microsoft.com/office/drawing/2014/main" id="{FE20F7C1-AA73-47C0-80EC-A8AA2DC66068}"/>
+                </a:ext>
+              </a:extLst>
+            </p:cNvPr>
+            <p:cNvSpPr/>
+            <p:nvPr/>
+          </p:nvSpPr>
+          <p:spPr>
+            <a:xfrm>
+              <a:off x="6664491" y="1813608"/>
+              <a:ext cx="3949002" cy="914400"/>
+            </a:xfrm>
+            <a:prstGeom prst="rect">
+              <a:avLst/>
+            </a:prstGeom>
+            <a:solidFill>
+              <a:schemeClr val="accent3"/>
+            </a:solidFill>
+            <a:ln>
+              <a:noFill/>
+            </a:ln>
+          </p:spPr>
+          <p:style>
+            <a:lnRef idx="2">
+              <a:schemeClr val="accent1">
+                <a:shade val="50000"/>
+              </a:schemeClr>
+            </a:lnRef>
+            <a:fillRef idx="1">
+              <a:schemeClr val="accent1"/>
+            </a:fillRef>
+            <a:effectRef idx="0">
+              <a:schemeClr val="accent1"/>
+            </a:effectRef>
+            <a:fontRef idx="minor">
+              <a:schemeClr val="lt1"/>
+            </a:fontRef>
+          </p:style>
+          <p:txBody>
+            <a:bodyPr rot="0" spcFirstLastPara="0" vertOverflow="overflow" horzOverflow="overflow" vert="horz" wrap="square" lIns="91440" tIns="45720" rIns="91440" bIns="45720" numCol="1" spcCol="0" rtlCol="0" fromWordArt="0" anchor="ctr" anchorCtr="0" forceAA="0" compatLnSpc="1">
+              <a:prstTxWarp prst="textNoShape">
+                <a:avLst/>
+              </a:prstTxWarp>
+              <a:noAutofit/>
+            </a:bodyPr>
+            <a:lstStyle/>
+            <a:p>
+              <a:pPr algn="ctr"/>
+              <a:r>
+                <a:rPr lang="en-US" b="1" dirty="0"/>
+                <a:t>By Reference</a:t>
+              </a:r>
+            </a:p>
+            <a:p>
+              <a:pPr marL="171450" indent="-171450" algn="ctr">
+                <a:buFontTx/>
+                <a:buChar char="-"/>
+              </a:pPr>
+              <a:r>
+                <a:rPr lang="en-US" sz="1400" b="1" dirty="0"/>
+                <a:t>Refers to the actual object</a:t>
+              </a:r>
+            </a:p>
+            <a:p>
+              <a:pPr marL="171450" indent="-171450" algn="ctr">
+                <a:buFontTx/>
+                <a:buChar char="-"/>
+              </a:pPr>
+              <a:r>
+                <a:rPr lang="en-US" sz="1400" b="1" dirty="0"/>
+                <a:t>The original object can change</a:t>
+              </a:r>
+            </a:p>
+            <a:p>
+              <a:pPr algn="ctr"/>
+              <a:r>
+                <a:rPr lang="en-US" sz="1400" b="1" dirty="0"/>
+                <a:t>- This is true for a chain of references!</a:t>
+              </a:r>
+            </a:p>
+          </p:txBody>
+        </p:sp>
+      </p:grpSp>
+      <p:sp>
+        <p:nvSpPr>
+          <p:cNvPr id="11" name="TextBox 10">
+            <a:extLst>
+              <a:ext uri="{FF2B5EF4-FFF2-40B4-BE49-F238E27FC236}">
+                <a16:creationId xmlns:a16="http://schemas.microsoft.com/office/drawing/2014/main" id="{44463066-BEE9-49D4-8203-765344EDD2A4}"/>
+              </a:ext>
+            </a:extLst>
+          </p:cNvPr>
+          <p:cNvSpPr txBox="1"/>
+          <p:nvPr/>
+        </p:nvSpPr>
+        <p:spPr>
+          <a:xfrm>
+            <a:off x="1457849" y="3215473"/>
+            <a:ext cx="3827584" cy="1949380"/>
+          </a:xfrm>
+          <a:prstGeom prst="rect">
+            <a:avLst/>
+          </a:prstGeom>
+          <a:noFill/>
+        </p:spPr>
+        <p:txBody>
+          <a:bodyPr wrap="square" lIns="0" tIns="0" rIns="0" bIns="0" rtlCol="0">
+            <a:noAutofit/>
+          </a:bodyPr>
+          <a:lstStyle/>
+          <a:p>
+            <a:pPr>
+              <a:buClr>
+                <a:schemeClr val="tx2"/>
+              </a:buClr>
+            </a:pPr>
+            <a:r>
+              <a:rPr lang="en-US" sz="1600" dirty="0"/>
+              <a:t>Examples:</a:t>
+            </a:r>
+          </a:p>
+          <a:p>
+            <a:pPr marL="171450" indent="-171450">
+              <a:buClr>
+                <a:schemeClr val="tx2"/>
+              </a:buClr>
+              <a:buFont typeface="Arial" panose="020B0604020202020204" pitchFamily="34" charset="0"/>
+              <a:buChar char="•"/>
+            </a:pPr>
+            <a:r>
+              <a:rPr lang="en-US" sz="1600" dirty="0"/>
+              <a:t>pandas functions that use the default </a:t>
+            </a:r>
+            <a:r>
+              <a:rPr lang="en-US" sz="1600" dirty="0" err="1">
+                <a:latin typeface="Courier New" panose="02070309020205020404" pitchFamily="49" charset="0"/>
+                <a:cs typeface="Courier New" panose="02070309020205020404" pitchFamily="49" charset="0"/>
+              </a:rPr>
+              <a:t>inplace</a:t>
+            </a:r>
+            <a:r>
+              <a:rPr lang="en-US" sz="1600" dirty="0">
+                <a:latin typeface="Courier New" panose="02070309020205020404" pitchFamily="49" charset="0"/>
+                <a:cs typeface="Courier New" panose="02070309020205020404" pitchFamily="49" charset="0"/>
+              </a:rPr>
+              <a:t>=False </a:t>
+            </a:r>
+            <a:r>
+              <a:rPr lang="en-US" sz="1600" dirty="0">
+                <a:latin typeface="+mj-lt"/>
+                <a:cs typeface="Courier New" panose="02070309020205020404" pitchFamily="49" charset="0"/>
+              </a:rPr>
+              <a:t>argument</a:t>
+            </a:r>
+          </a:p>
+          <a:p>
+            <a:pPr marL="171450" indent="-171450">
+              <a:buClr>
+                <a:schemeClr val="tx2"/>
+              </a:buClr>
+              <a:buFont typeface="Arial" panose="020B0604020202020204" pitchFamily="34" charset="0"/>
+              <a:buChar char="•"/>
+            </a:pPr>
+            <a:endParaRPr lang="en-US" sz="1600" dirty="0">
+              <a:latin typeface="+mj-lt"/>
+              <a:cs typeface="Courier New" panose="02070309020205020404" pitchFamily="49" charset="0"/>
+            </a:endParaRPr>
+          </a:p>
+          <a:p>
+            <a:pPr marL="171450" indent="-171450">
+              <a:buClr>
+                <a:schemeClr val="tx2"/>
+              </a:buClr>
+              <a:buFont typeface="Arial" panose="020B0604020202020204" pitchFamily="34" charset="0"/>
+              <a:buChar char="•"/>
+            </a:pPr>
+            <a:r>
+              <a:rPr lang="en-US" sz="1600" dirty="0">
+                <a:latin typeface="+mj-lt"/>
+                <a:cs typeface="Courier New" panose="02070309020205020404" pitchFamily="49" charset="0"/>
+              </a:rPr>
+              <a:t>Objects (including pandas </a:t>
+            </a:r>
+            <a:r>
+              <a:rPr lang="en-US" sz="1600" dirty="0" err="1">
+                <a:latin typeface="+mj-lt"/>
+                <a:cs typeface="Courier New" panose="02070309020205020404" pitchFamily="49" charset="0"/>
+              </a:rPr>
+              <a:t>dataframes</a:t>
+            </a:r>
+            <a:r>
+              <a:rPr lang="en-US" sz="1600" dirty="0">
+                <a:latin typeface="+mj-lt"/>
+                <a:cs typeface="Courier New" panose="02070309020205020404" pitchFamily="49" charset="0"/>
+              </a:rPr>
+              <a:t> and series) that use the </a:t>
+            </a:r>
+            <a:r>
+              <a:rPr lang="en-US" sz="1600" dirty="0">
+                <a:latin typeface="Courier New" panose="02070309020205020404" pitchFamily="49" charset="0"/>
+                <a:cs typeface="Courier New" panose="02070309020205020404" pitchFamily="49" charset="0"/>
+              </a:rPr>
+              <a:t>.copy() </a:t>
+            </a:r>
+            <a:r>
+              <a:rPr lang="en-US" sz="1600" dirty="0">
+                <a:latin typeface="+mj-lt"/>
+                <a:cs typeface="Courier New" panose="02070309020205020404" pitchFamily="49" charset="0"/>
+              </a:rPr>
+              <a:t>function</a:t>
+            </a:r>
+            <a:endParaRPr lang="en-US" sz="1600" dirty="0"/>
+          </a:p>
+        </p:txBody>
+      </p:sp>
+      <p:sp>
+        <p:nvSpPr>
+          <p:cNvPr id="12" name="TextBox 11">
+            <a:extLst>
+              <a:ext uri="{FF2B5EF4-FFF2-40B4-BE49-F238E27FC236}">
+                <a16:creationId xmlns:a16="http://schemas.microsoft.com/office/drawing/2014/main" id="{A0B32E22-CE59-4FAD-80A2-030FEB0868B5}"/>
+              </a:ext>
+            </a:extLst>
+          </p:cNvPr>
+          <p:cNvSpPr txBox="1"/>
+          <p:nvPr/>
+        </p:nvSpPr>
+        <p:spPr>
+          <a:xfrm>
+            <a:off x="6845859" y="3215473"/>
+            <a:ext cx="3827584" cy="1949380"/>
+          </a:xfrm>
+          <a:prstGeom prst="rect">
+            <a:avLst/>
+          </a:prstGeom>
+          <a:noFill/>
+        </p:spPr>
+        <p:txBody>
+          <a:bodyPr wrap="square" lIns="0" tIns="0" rIns="0" bIns="0" rtlCol="0">
+            <a:noAutofit/>
+          </a:bodyPr>
+          <a:lstStyle/>
+          <a:p>
+            <a:pPr>
+              <a:buClr>
+                <a:schemeClr val="tx2"/>
+              </a:buClr>
+            </a:pPr>
+            <a:r>
+              <a:rPr lang="en-US" sz="1600" dirty="0"/>
+              <a:t>Examples:</a:t>
+            </a:r>
+          </a:p>
+          <a:p>
+            <a:pPr marL="171450" indent="-171450">
+              <a:buClr>
+                <a:schemeClr val="tx2"/>
+              </a:buClr>
+              <a:buFont typeface="Arial" panose="020B0604020202020204" pitchFamily="34" charset="0"/>
+              <a:buChar char="•"/>
+            </a:pPr>
+            <a:r>
+              <a:rPr lang="en-US" sz="1600" dirty="0"/>
+              <a:t>pandas functions that use the </a:t>
+            </a:r>
+            <a:r>
+              <a:rPr lang="en-US" sz="1600" dirty="0" err="1">
+                <a:latin typeface="Courier New" panose="02070309020205020404" pitchFamily="49" charset="0"/>
+                <a:cs typeface="Courier New" panose="02070309020205020404" pitchFamily="49" charset="0"/>
+              </a:rPr>
+              <a:t>inplace</a:t>
+            </a:r>
+            <a:r>
+              <a:rPr lang="en-US" sz="1600" dirty="0">
+                <a:latin typeface="Courier New" panose="02070309020205020404" pitchFamily="49" charset="0"/>
+                <a:cs typeface="Courier New" panose="02070309020205020404" pitchFamily="49" charset="0"/>
+              </a:rPr>
+              <a:t>=True </a:t>
+            </a:r>
+            <a:r>
+              <a:rPr lang="en-US" sz="1600" dirty="0">
+                <a:latin typeface="+mj-lt"/>
+                <a:cs typeface="Courier New" panose="02070309020205020404" pitchFamily="49" charset="0"/>
+              </a:rPr>
+              <a:t>argument</a:t>
+            </a:r>
+          </a:p>
+          <a:p>
+            <a:pPr marL="171450" indent="-171450">
+              <a:buClr>
+                <a:schemeClr val="tx2"/>
+              </a:buClr>
+              <a:buFont typeface="Arial" panose="020B0604020202020204" pitchFamily="34" charset="0"/>
+              <a:buChar char="•"/>
+            </a:pPr>
+            <a:endParaRPr lang="en-US" sz="1600" dirty="0">
+              <a:latin typeface="+mj-lt"/>
+              <a:cs typeface="Courier New" panose="02070309020205020404" pitchFamily="49" charset="0"/>
+            </a:endParaRPr>
+          </a:p>
+          <a:p>
+            <a:pPr marL="171450" indent="-171450">
+              <a:buClr>
+                <a:schemeClr val="tx2"/>
+              </a:buClr>
+              <a:buFont typeface="Arial" panose="020B0604020202020204" pitchFamily="34" charset="0"/>
+              <a:buChar char="•"/>
+            </a:pPr>
+            <a:r>
+              <a:rPr lang="en-US" sz="1600" dirty="0">
+                <a:latin typeface="+mj-lt"/>
+                <a:cs typeface="Courier New" panose="02070309020205020404" pitchFamily="49" charset="0"/>
+              </a:rPr>
+              <a:t>Assigning value to a pandas </a:t>
+            </a:r>
+            <a:r>
+              <a:rPr lang="en-US" sz="1600" dirty="0" err="1">
+                <a:latin typeface="+mj-lt"/>
+                <a:cs typeface="Courier New" panose="02070309020205020404" pitchFamily="49" charset="0"/>
+              </a:rPr>
+              <a:t>DataFrame</a:t>
+            </a:r>
+            <a:r>
+              <a:rPr lang="en-US" sz="1600" dirty="0">
+                <a:latin typeface="+mj-lt"/>
+                <a:cs typeface="Courier New" panose="02070309020205020404" pitchFamily="49" charset="0"/>
+              </a:rPr>
+              <a:t> or Series without </a:t>
+            </a:r>
+            <a:r>
+              <a:rPr lang="en-US" sz="1600" dirty="0">
+                <a:latin typeface="Courier New" panose="02070309020205020404" pitchFamily="49" charset="0"/>
+                <a:cs typeface="Courier New" panose="02070309020205020404" pitchFamily="49" charset="0"/>
+              </a:rPr>
+              <a:t>.copy()</a:t>
+            </a:r>
+          </a:p>
+          <a:p>
+            <a:pPr marL="628650" lvl="1" indent="-171450">
+              <a:buClr>
+                <a:schemeClr val="tx2"/>
+              </a:buClr>
+              <a:buFont typeface="Arial" panose="020B0604020202020204" pitchFamily="34" charset="0"/>
+              <a:buChar char="•"/>
+            </a:pPr>
+            <a:r>
+              <a:rPr lang="en-US" sz="1600" dirty="0">
+                <a:latin typeface="Courier New" panose="02070309020205020404" pitchFamily="49" charset="0"/>
+                <a:cs typeface="Courier New" panose="02070309020205020404" pitchFamily="49" charset="0"/>
+              </a:rPr>
+              <a:t>Chain of references:</a:t>
+            </a:r>
+          </a:p>
+          <a:p>
+            <a:pPr lvl="1">
+              <a:buClr>
+                <a:schemeClr val="tx2"/>
+              </a:buClr>
+            </a:pPr>
+            <a:r>
+              <a:rPr lang="en-US" sz="1600" dirty="0">
+                <a:latin typeface="Courier New" panose="02070309020205020404" pitchFamily="49" charset="0"/>
+                <a:cs typeface="Courier New" panose="02070309020205020404" pitchFamily="49" charset="0"/>
+              </a:rPr>
+              <a:t>df1 = df</a:t>
+            </a:r>
+          </a:p>
+          <a:p>
+            <a:pPr lvl="1">
+              <a:buClr>
+                <a:schemeClr val="tx2"/>
+              </a:buClr>
+            </a:pPr>
+            <a:r>
+              <a:rPr lang="en-US" sz="1600" dirty="0">
+                <a:latin typeface="Courier New" panose="02070309020205020404" pitchFamily="49" charset="0"/>
+                <a:cs typeface="Courier New" panose="02070309020205020404" pitchFamily="49" charset="0"/>
+              </a:rPr>
+              <a:t>df1[‘column’] = 5</a:t>
+            </a:r>
+          </a:p>
+          <a:p>
+            <a:pPr lvl="1">
+              <a:buClr>
+                <a:schemeClr val="tx2"/>
+              </a:buClr>
+            </a:pPr>
+            <a:r>
+              <a:rPr lang="en-US" sz="1600" dirty="0">
+                <a:latin typeface="Courier New" panose="02070309020205020404" pitchFamily="49" charset="0"/>
+                <a:cs typeface="Courier New" panose="02070309020205020404" pitchFamily="49" charset="0"/>
+              </a:rPr>
+              <a:t>Changes ‘column’ of df! </a:t>
+            </a:r>
+          </a:p>
+          <a:p>
+            <a:pPr lvl="1">
+              <a:buClr>
+                <a:schemeClr val="tx2"/>
+              </a:buClr>
+            </a:pPr>
+            <a:r>
+              <a:rPr lang="en-US" sz="1600" dirty="0">
+                <a:latin typeface="Courier New" panose="02070309020205020404" pitchFamily="49" charset="0"/>
+                <a:cs typeface="Courier New" panose="02070309020205020404" pitchFamily="49" charset="0"/>
+              </a:rPr>
+              <a:t>df1 “points” to df.</a:t>
             </a:r>
           </a:p>
         </p:txBody>
@@ -18362,7 +19074,7 @@
     </p:spTree>
     <p:extLst>
       <p:ext uri="{BB962C8B-B14F-4D97-AF65-F5344CB8AC3E}">
-        <p14:creationId xmlns:p14="http://schemas.microsoft.com/office/powerpoint/2010/main" val="378296408"/>
+        <p14:creationId xmlns:p14="http://schemas.microsoft.com/office/powerpoint/2010/main" val="1168521859"/>
       </p:ext>
     </p:extLst>
   </p:cSld>
@@ -18714,6 +19426,398 @@
     <p:extLst>
       <p:ext uri="{BB962C8B-B14F-4D97-AF65-F5344CB8AC3E}">
         <p14:creationId xmlns:p14="http://schemas.microsoft.com/office/powerpoint/2010/main" val="1702534771"/>
+      </p:ext>
+    </p:extLst>
+  </p:cSld>
+  <p:clrMapOvr>
+    <a:masterClrMapping/>
+  </p:clrMapOvr>
+</p:sld>
+</file>
+
+<file path=ppt/slides/slide20.xml><?xml version="1.0" encoding="utf-8"?>
+<p:sld xmlns:a="http://schemas.openxmlformats.org/drawingml/2006/main" xmlns:r="http://schemas.openxmlformats.org/officeDocument/2006/relationships" xmlns:p="http://schemas.openxmlformats.org/presentationml/2006/main">
+  <p:cSld>
+    <p:spTree>
+      <p:nvGrpSpPr>
+        <p:cNvPr id="1" name=""/>
+        <p:cNvGrpSpPr/>
+        <p:nvPr/>
+      </p:nvGrpSpPr>
+      <p:grpSpPr>
+        <a:xfrm>
+          <a:off x="0" y="0"/>
+          <a:ext cx="0" cy="0"/>
+          <a:chOff x="0" y="0"/>
+          <a:chExt cx="0" cy="0"/>
+        </a:xfrm>
+      </p:grpSpPr>
+      <p:sp>
+        <p:nvSpPr>
+          <p:cNvPr id="2" name="Content Placeholder 1">
+            <a:extLst>
+              <a:ext uri="{FF2B5EF4-FFF2-40B4-BE49-F238E27FC236}">
+                <a16:creationId xmlns:a16="http://schemas.microsoft.com/office/drawing/2014/main" id="{C34EB546-15B1-4E2B-AA70-41D43110B8B9}"/>
+              </a:ext>
+            </a:extLst>
+          </p:cNvPr>
+          <p:cNvSpPr>
+            <a:spLocks noGrp="1"/>
+          </p:cNvSpPr>
+          <p:nvPr>
+            <p:ph idx="1"/>
+          </p:nvPr>
+        </p:nvSpPr>
+        <p:spPr/>
+        <p:txBody>
+          <a:bodyPr/>
+          <a:lstStyle/>
+          <a:p>
+            <a:r>
+              <a:rPr lang="en-US" dirty="0"/>
+              <a:t>This will be illustrated in </a:t>
+            </a:r>
+            <a:r>
+              <a:rPr lang="en-US" dirty="0" err="1"/>
+              <a:t>JupyterLab</a:t>
+            </a:r>
+            <a:endParaRPr lang="en-US" dirty="0"/>
+          </a:p>
+        </p:txBody>
+      </p:sp>
+      <p:sp>
+        <p:nvSpPr>
+          <p:cNvPr id="3" name="Text Placeholder 2">
+            <a:extLst>
+              <a:ext uri="{FF2B5EF4-FFF2-40B4-BE49-F238E27FC236}">
+                <a16:creationId xmlns:a16="http://schemas.microsoft.com/office/drawing/2014/main" id="{4293D631-C97F-48A5-B258-4531F256C82B}"/>
+              </a:ext>
+            </a:extLst>
+          </p:cNvPr>
+          <p:cNvSpPr>
+            <a:spLocks noGrp="1"/>
+          </p:cNvSpPr>
+          <p:nvPr>
+            <p:ph type="body" sz="quarter" idx="15"/>
+          </p:nvPr>
+        </p:nvSpPr>
+        <p:spPr/>
+        <p:txBody>
+          <a:bodyPr/>
+          <a:lstStyle/>
+          <a:p>
+            <a:endParaRPr lang="en-US"/>
+          </a:p>
+        </p:txBody>
+      </p:sp>
+      <p:sp>
+        <p:nvSpPr>
+          <p:cNvPr id="4" name="Title 3">
+            <a:extLst>
+              <a:ext uri="{FF2B5EF4-FFF2-40B4-BE49-F238E27FC236}">
+                <a16:creationId xmlns:a16="http://schemas.microsoft.com/office/drawing/2014/main" id="{04E01A0A-1C33-4557-9416-6763538A819A}"/>
+              </a:ext>
+            </a:extLst>
+          </p:cNvPr>
+          <p:cNvSpPr>
+            <a:spLocks noGrp="1"/>
+          </p:cNvSpPr>
+          <p:nvPr>
+            <p:ph type="title"/>
+          </p:nvPr>
+        </p:nvSpPr>
+        <p:spPr/>
+        <p:txBody>
+          <a:bodyPr/>
+          <a:lstStyle/>
+          <a:p>
+            <a:r>
+              <a:rPr lang="en-US" dirty="0"/>
+              <a:t>Merging, EDA, Transforming, Encoding</a:t>
+            </a:r>
+          </a:p>
+        </p:txBody>
+      </p:sp>
+    </p:spTree>
+    <p:extLst>
+      <p:ext uri="{BB962C8B-B14F-4D97-AF65-F5344CB8AC3E}">
+        <p14:creationId xmlns:p14="http://schemas.microsoft.com/office/powerpoint/2010/main" val="3806947584"/>
+      </p:ext>
+    </p:extLst>
+  </p:cSld>
+  <p:clrMapOvr>
+    <a:masterClrMapping/>
+  </p:clrMapOvr>
+</p:sld>
+</file>
+
+<file path=ppt/slides/slide21.xml><?xml version="1.0" encoding="utf-8"?>
+<p:sld xmlns:a="http://schemas.openxmlformats.org/drawingml/2006/main" xmlns:r="http://schemas.openxmlformats.org/officeDocument/2006/relationships" xmlns:p="http://schemas.openxmlformats.org/presentationml/2006/main">
+  <p:cSld>
+    <p:spTree>
+      <p:nvGrpSpPr>
+        <p:cNvPr id="1" name=""/>
+        <p:cNvGrpSpPr/>
+        <p:nvPr/>
+      </p:nvGrpSpPr>
+      <p:grpSpPr>
+        <a:xfrm>
+          <a:off x="0" y="0"/>
+          <a:ext cx="0" cy="0"/>
+          <a:chOff x="0" y="0"/>
+          <a:chExt cx="0" cy="0"/>
+        </a:xfrm>
+      </p:grpSpPr>
+      <p:sp>
+        <p:nvSpPr>
+          <p:cNvPr id="2" name="Content Placeholder 1">
+            <a:extLst>
+              <a:ext uri="{FF2B5EF4-FFF2-40B4-BE49-F238E27FC236}">
+                <a16:creationId xmlns:a16="http://schemas.microsoft.com/office/drawing/2014/main" id="{C34EB546-15B1-4E2B-AA70-41D43110B8B9}"/>
+              </a:ext>
+            </a:extLst>
+          </p:cNvPr>
+          <p:cNvSpPr>
+            <a:spLocks noGrp="1"/>
+          </p:cNvSpPr>
+          <p:nvPr>
+            <p:ph idx="1"/>
+          </p:nvPr>
+        </p:nvSpPr>
+        <p:spPr/>
+        <p:txBody>
+          <a:bodyPr/>
+          <a:lstStyle/>
+          <a:p>
+            <a:r>
+              <a:rPr lang="en-US" sz="3200" dirty="0"/>
+              <a:t>This will be illustrated in </a:t>
+            </a:r>
+            <a:r>
+              <a:rPr lang="en-US" sz="3200" dirty="0" err="1"/>
+              <a:t>JupyterLab</a:t>
+            </a:r>
+            <a:endParaRPr lang="en-US" sz="3200" dirty="0"/>
+          </a:p>
+          <a:p>
+            <a:endParaRPr lang="en-US" sz="3200" dirty="0"/>
+          </a:p>
+          <a:p>
+            <a:r>
+              <a:rPr lang="en-US" sz="3200" dirty="0"/>
+              <a:t>We use seaborn – a high-level interface for </a:t>
+            </a:r>
+            <a:r>
+              <a:rPr lang="en-US" sz="3200"/>
+              <a:t>matplotlib.</a:t>
+            </a:r>
+          </a:p>
+          <a:p>
+            <a:endParaRPr lang="en-US" sz="3200" dirty="0"/>
+          </a:p>
+          <a:p>
+            <a:pPr lvl="1"/>
+            <a:r>
+              <a:rPr lang="en-US" sz="3200" dirty="0"/>
+              <a:t>For more ideas in seaborn, see </a:t>
+            </a:r>
+            <a:r>
+              <a:rPr lang="en-US" sz="3200" dirty="0">
+                <a:hlinkClick r:id="rId2"/>
+              </a:rPr>
+              <a:t>https://seaborn.pydata.org/</a:t>
+            </a:r>
+            <a:endParaRPr lang="en-US" sz="3200" dirty="0"/>
+          </a:p>
+        </p:txBody>
+      </p:sp>
+      <p:sp>
+        <p:nvSpPr>
+          <p:cNvPr id="3" name="Text Placeholder 2">
+            <a:extLst>
+              <a:ext uri="{FF2B5EF4-FFF2-40B4-BE49-F238E27FC236}">
+                <a16:creationId xmlns:a16="http://schemas.microsoft.com/office/drawing/2014/main" id="{4293D631-C97F-48A5-B258-4531F256C82B}"/>
+              </a:ext>
+            </a:extLst>
+          </p:cNvPr>
+          <p:cNvSpPr>
+            <a:spLocks noGrp="1"/>
+          </p:cNvSpPr>
+          <p:nvPr>
+            <p:ph type="body" sz="quarter" idx="15"/>
+          </p:nvPr>
+        </p:nvSpPr>
+        <p:spPr/>
+        <p:txBody>
+          <a:bodyPr/>
+          <a:lstStyle/>
+          <a:p>
+            <a:endParaRPr lang="en-US"/>
+          </a:p>
+        </p:txBody>
+      </p:sp>
+      <p:sp>
+        <p:nvSpPr>
+          <p:cNvPr id="4" name="Title 3">
+            <a:extLst>
+              <a:ext uri="{FF2B5EF4-FFF2-40B4-BE49-F238E27FC236}">
+                <a16:creationId xmlns:a16="http://schemas.microsoft.com/office/drawing/2014/main" id="{04E01A0A-1C33-4557-9416-6763538A819A}"/>
+              </a:ext>
+            </a:extLst>
+          </p:cNvPr>
+          <p:cNvSpPr>
+            <a:spLocks noGrp="1"/>
+          </p:cNvSpPr>
+          <p:nvPr>
+            <p:ph type="title"/>
+          </p:nvPr>
+        </p:nvSpPr>
+        <p:spPr/>
+        <p:txBody>
+          <a:bodyPr/>
+          <a:lstStyle/>
+          <a:p>
+            <a:r>
+              <a:rPr lang="en-US" dirty="0"/>
+              <a:t>Plotting</a:t>
+            </a:r>
+          </a:p>
+        </p:txBody>
+      </p:sp>
+    </p:spTree>
+    <p:extLst>
+      <p:ext uri="{BB962C8B-B14F-4D97-AF65-F5344CB8AC3E}">
+        <p14:creationId xmlns:p14="http://schemas.microsoft.com/office/powerpoint/2010/main" val="3002651699"/>
+      </p:ext>
+    </p:extLst>
+  </p:cSld>
+  <p:clrMapOvr>
+    <a:masterClrMapping/>
+  </p:clrMapOvr>
+</p:sld>
+</file>
+
+<file path=ppt/slides/slide22.xml><?xml version="1.0" encoding="utf-8"?>
+<p:sld xmlns:a="http://schemas.openxmlformats.org/drawingml/2006/main" xmlns:r="http://schemas.openxmlformats.org/officeDocument/2006/relationships" xmlns:p="http://schemas.openxmlformats.org/presentationml/2006/main">
+  <p:cSld>
+    <p:spTree>
+      <p:nvGrpSpPr>
+        <p:cNvPr id="1" name=""/>
+        <p:cNvGrpSpPr/>
+        <p:nvPr/>
+      </p:nvGrpSpPr>
+      <p:grpSpPr>
+        <a:xfrm>
+          <a:off x="0" y="0"/>
+          <a:ext cx="0" cy="0"/>
+          <a:chOff x="0" y="0"/>
+          <a:chExt cx="0" cy="0"/>
+        </a:xfrm>
+      </p:grpSpPr>
+      <p:sp>
+        <p:nvSpPr>
+          <p:cNvPr id="3" name="Text Placeholder 2">
+            <a:extLst>
+              <a:ext uri="{FF2B5EF4-FFF2-40B4-BE49-F238E27FC236}">
+                <a16:creationId xmlns:a16="http://schemas.microsoft.com/office/drawing/2014/main" id="{6B23F3AF-1809-4371-8A2E-4471BD721F9F}"/>
+              </a:ext>
+            </a:extLst>
+          </p:cNvPr>
+          <p:cNvSpPr>
+            <a:spLocks noGrp="1"/>
+          </p:cNvSpPr>
+          <p:nvPr>
+            <p:ph type="body" sz="quarter" idx="15"/>
+          </p:nvPr>
+        </p:nvSpPr>
+        <p:spPr/>
+        <p:txBody>
+          <a:bodyPr/>
+          <a:lstStyle/>
+          <a:p>
+            <a:endParaRPr lang="en-US"/>
+          </a:p>
+        </p:txBody>
+      </p:sp>
+      <p:sp>
+        <p:nvSpPr>
+          <p:cNvPr id="4" name="Title 3">
+            <a:extLst>
+              <a:ext uri="{FF2B5EF4-FFF2-40B4-BE49-F238E27FC236}">
+                <a16:creationId xmlns:a16="http://schemas.microsoft.com/office/drawing/2014/main" id="{CC106F12-BA2E-4C7E-A35B-F5E06CDBEE57}"/>
+              </a:ext>
+            </a:extLst>
+          </p:cNvPr>
+          <p:cNvSpPr>
+            <a:spLocks noGrp="1"/>
+          </p:cNvSpPr>
+          <p:nvPr>
+            <p:ph type="title"/>
+          </p:nvPr>
+        </p:nvSpPr>
+        <p:spPr/>
+        <p:txBody>
+          <a:bodyPr/>
+          <a:lstStyle/>
+          <a:p>
+            <a:r>
+              <a:rPr lang="en-US" dirty="0"/>
+              <a:t>Questions?</a:t>
+            </a:r>
+          </a:p>
+        </p:txBody>
+      </p:sp>
+      <p:pic>
+        <p:nvPicPr>
+          <p:cNvPr id="1026" name="Picture 2" descr="Don&amp;#39;t Forget the Big 4 Questions to Ask During Any Mega-Acquisition">
+            <a:extLst>
+              <a:ext uri="{FF2B5EF4-FFF2-40B4-BE49-F238E27FC236}">
+                <a16:creationId xmlns:a16="http://schemas.microsoft.com/office/drawing/2014/main" id="{62A40B6A-1A53-48C0-885A-0B84603292F2}"/>
+              </a:ext>
+            </a:extLst>
+          </p:cNvPr>
+          <p:cNvPicPr>
+            <a:picLocks noChangeAspect="1" noChangeArrowheads="1"/>
+          </p:cNvPicPr>
+          <p:nvPr/>
+        </p:nvPicPr>
+        <p:blipFill>
+          <a:blip r:embed="rId3">
+            <a:extLst>
+              <a:ext uri="{28A0092B-C50C-407E-A947-70E740481C1C}">
+                <a14:useLocalDpi xmlns:a14="http://schemas.microsoft.com/office/drawing/2010/main" val="0"/>
+              </a:ext>
+            </a:extLst>
+          </a:blip>
+          <a:srcRect/>
+          <a:stretch>
+            <a:fillRect/>
+          </a:stretch>
+        </p:blipFill>
+        <p:spPr bwMode="auto">
+          <a:xfrm>
+            <a:off x="3256230" y="1147632"/>
+            <a:ext cx="5679541" cy="4562736"/>
+          </a:xfrm>
+          <a:prstGeom prst="rect">
+            <a:avLst/>
+          </a:prstGeom>
+          <a:noFill/>
+          <a:extLst>
+            <a:ext uri="{909E8E84-426E-40DD-AFC4-6F175D3DCCD1}">
+              <a14:hiddenFill xmlns:a14="http://schemas.microsoft.com/office/drawing/2010/main">
+                <a:solidFill>
+                  <a:srgbClr val="FFFFFF"/>
+                </a:solidFill>
+              </a14:hiddenFill>
+            </a:ext>
+          </a:extLst>
+        </p:spPr>
+      </p:pic>
+    </p:spTree>
+    <p:extLst>
+      <p:ext uri="{BB962C8B-B14F-4D97-AF65-F5344CB8AC3E}">
+        <p14:creationId xmlns:p14="http://schemas.microsoft.com/office/powerpoint/2010/main" val="378296408"/>
       </p:ext>
     </p:extLst>
   </p:cSld>
@@ -18936,7 +20040,7 @@
           <a:p>
             <a:r>
               <a:rPr lang="en-US" sz="2400" dirty="0"/>
-              <a:t>A Multi-paradigm, object-oriented, functional, procedural interpreted (i.e. not compiled) language</a:t>
+              <a:t>A Multi-paradigm, object-oriented, functional, procedural, interpreted (i.e. not compiled) language</a:t>
             </a:r>
           </a:p>
           <a:p>
@@ -19926,7 +21030,7 @@
             <a:pPr lvl="1"/>
             <a:r>
               <a:rPr lang="en-US" dirty="0"/>
-              <a:t>Install either for “just me” to avoid the need for admin rights</a:t>
+              <a:t>Install for “just me” to avoid the need for admin rights</a:t>
             </a:r>
           </a:p>
         </p:txBody>
@@ -20526,7 +21630,7 @@
           <p:nvPr>
             <p:extLst>
               <p:ext uri="{D42A27DB-BD31-4B8C-83A1-F6EECF244321}">
-                <p14:modId xmlns:p14="http://schemas.microsoft.com/office/powerpoint/2010/main" val="2333516219"/>
+                <p14:modId xmlns:p14="http://schemas.microsoft.com/office/powerpoint/2010/main" val="528606837"/>
               </p:ext>
             </p:extLst>
           </p:nvPr>
@@ -20778,7 +21882,7 @@
                           <a:latin typeface="Courier New" panose="02070309020205020404" pitchFamily="49" charset="0"/>
                           <a:cs typeface="Courier New" panose="02070309020205020404" pitchFamily="49" charset="0"/>
                         </a:rPr>
-                        <a:t>Python –m pip install </a:t>
+                        <a:t>python –m pip install </a:t>
                       </a:r>
                       <a:r>
                         <a:rPr lang="en-US" dirty="0" err="1">

</xml_diff>